<commit_message>
add hw to assitant analysis - still need to fix ppt generation
</commit_message>
<xml_diff>
--- a/Assistant Create/Promotional_Conference.pptx
+++ b/Assistant Create/Promotional_Conference.pptx
@@ -3113,8 +3113,8 @@
         </p:blipFill>
         <p:spPr>
           <a:xfrm>
-            <a:off x="1828800" y="1828800"/>
-            <a:ext cx="5486400" cy="3200400"/>
+            <a:off x="182880" y="1645920"/>
+            <a:ext cx="8778240" cy="4480560"/>
           </a:xfrm>
           <a:prstGeom prst="rect">
             <a:avLst/>
@@ -3188,7 +3188,7 @@
           <a:noFill/>
         </p:spPr>
         <p:txBody>
-          <a:bodyPr wrap="none" tIns="91440">
+          <a:bodyPr wrap="none">
             <a:spAutoFit/>
           </a:bodyPr>
           <a:lstStyle/>
@@ -3215,8 +3215,8 @@
         </p:nvSpPr>
         <p:spPr>
           <a:xfrm>
-            <a:off x="6096000" y="1371600"/>
-            <a:ext cx="3048000" cy="4114800"/>
+            <a:off x="6096000" y="1645920"/>
+            <a:ext cx="3048000" cy="5029200"/>
           </a:xfrm>
           <a:prstGeom prst="rect">
             <a:avLst/>
@@ -3233,7 +3233,7 @@
             <a:pPr algn="l">
               <a:defRPr b="1" sz="2400">
                 <a:solidFill>
-                  <a:srgbClr val="008064"/>
+                  <a:srgbClr val="FFD700"/>
                 </a:solidFill>
               </a:defRPr>
             </a:pPr>
@@ -3253,11 +3253,11 @@
               </a:defRPr>
             </a:pPr>
             <a:r>
-              <a:t>• The chart highlights significant fluctuations in track popularity by year, with some artists peaking notably in specific years.</a:t>
+              <a:t>• The chart highlights significant fluctuations in track popularity by year.</a:t>
             </a:r>
             <a:br/>
             <a:r>
-              <a:t>• A discernible trend of increasing track popularity post-2015 across multiple artists suggests evolving listener preferences.</a:t>
+              <a:t>• Increasing track popularity post-2015 suggests evolving listener preferences.</a:t>
             </a:r>
           </a:p>
         </p:txBody>

</xml_diff>

<commit_message>
Fixed bugs in assistant create
</commit_message>
<xml_diff>
--- a/Assistant Create/Promotional_Conference.pptx
+++ b/Assistant Create/Promotional_Conference.pptx
@@ -5,8 +5,10 @@
     <p:sldMasterId id="2147483648" r:id="rId1"/>
   </p:sldMasterIdLst>
   <p:sldIdLst>
-    <p:sldId id="256" r:id="rId7"/>
-    <p:sldId id="257" r:id="rId8"/>
+    <p:sldId id="256" r:id="rId2"/>
+    <p:sldId id="257" r:id="rId3"/>
+    <p:sldId id="258" r:id="rId4"/>
+    <p:sldId id="259" r:id="rId5"/>
   </p:sldIdLst>
   <p:sldSz cx="9144000" cy="6858000" type="screen4x3"/>
   <p:notesSz cx="6858000" cy="9144000"/>
@@ -105,6 +107,22 @@
       </a:defRPr>
     </a:lvl9pPr>
   </p:defaultTextStyle>
+  <p:extLst>
+    <p:ext uri="{EFAFB233-063F-42B5-8137-9DF3F51BA10A}">
+      <p15:sldGuideLst xmlns:p15="http://schemas.microsoft.com/office/powerpoint/2012/main">
+        <p15:guide id="1" orient="horz" pos="2160">
+          <p15:clr>
+            <a:srgbClr val="A4A3A4"/>
+          </p15:clr>
+        </p15:guide>
+        <p15:guide id="2" pos="2880">
+          <p15:clr>
+            <a:srgbClr val="A4A3A4"/>
+          </p15:clr>
+        </p15:guide>
+      </p15:sldGuideLst>
+    </p:ext>
+  </p:extLst>
 </p:presentation>
 </file>
 
@@ -146,10 +164,9 @@
           <a:lstStyle/>
           <a:p>
             <a:r>
-              <a:rPr lang="en-US" smtClean="0"/>
+              <a:rPr lang="en-US"/>
               <a:t>Click to edit Master title style</a:t>
             </a:r>
-            <a:endParaRPr lang="en-US"/>
           </a:p>
         </p:txBody>
       </p:sp>
@@ -265,10 +282,9 @@
           </a:lstStyle>
           <a:p>
             <a:r>
-              <a:rPr lang="en-US" smtClean="0"/>
+              <a:rPr lang="en-US"/>
               <a:t>Click to edit Master subtitle style</a:t>
             </a:r>
-            <a:endParaRPr lang="en-US"/>
           </a:p>
         </p:txBody>
       </p:sp>
@@ -289,7 +305,7 @@
           <a:p>
             <a:fld id="{5BCAD085-E8A6-8845-BD4E-CB4CCA059FC4}" type="datetimeFigureOut">
               <a:rPr lang="en-US" smtClean="0"/>
-              <a:t>1/27/13</a:t>
+              <a:t>6/2/2025</a:t>
             </a:fld>
             <a:endParaRPr lang="en-US"/>
           </a:p>
@@ -383,10 +399,9 @@
           <a:lstStyle/>
           <a:p>
             <a:r>
-              <a:rPr lang="en-US" smtClean="0"/>
+              <a:rPr lang="en-US"/>
               <a:t>Click to edit Master title style</a:t>
             </a:r>
-            <a:endParaRPr lang="en-US"/>
           </a:p>
         </p:txBody>
       </p:sp>
@@ -407,38 +422,37 @@
           <a:p>
             <a:pPr lvl="0"/>
             <a:r>
-              <a:rPr lang="en-US" smtClean="0"/>
+              <a:rPr lang="en-US"/>
               <a:t>Click to edit Master text styles</a:t>
             </a:r>
           </a:p>
           <a:p>
             <a:pPr lvl="1"/>
             <a:r>
-              <a:rPr lang="en-US" smtClean="0"/>
+              <a:rPr lang="en-US"/>
               <a:t>Second level</a:t>
             </a:r>
           </a:p>
           <a:p>
             <a:pPr lvl="2"/>
             <a:r>
-              <a:rPr lang="en-US" smtClean="0"/>
+              <a:rPr lang="en-US"/>
               <a:t>Third level</a:t>
             </a:r>
           </a:p>
           <a:p>
             <a:pPr lvl="3"/>
             <a:r>
-              <a:rPr lang="en-US" smtClean="0"/>
+              <a:rPr lang="en-US"/>
               <a:t>Fourth level</a:t>
             </a:r>
           </a:p>
           <a:p>
             <a:pPr lvl="4"/>
             <a:r>
-              <a:rPr lang="en-US" smtClean="0"/>
+              <a:rPr lang="en-US"/>
               <a:t>Fifth level</a:t>
             </a:r>
-            <a:endParaRPr lang="en-US"/>
           </a:p>
         </p:txBody>
       </p:sp>
@@ -459,7 +473,7 @@
           <a:p>
             <a:fld id="{5BCAD085-E8A6-8845-BD4E-CB4CCA059FC4}" type="datetimeFigureOut">
               <a:rPr lang="en-US" smtClean="0"/>
-              <a:t>1/27/13</a:t>
+              <a:t>6/2/2025</a:t>
             </a:fld>
             <a:endParaRPr lang="en-US"/>
           </a:p>
@@ -558,10 +572,9 @@
           <a:lstStyle/>
           <a:p>
             <a:r>
-              <a:rPr lang="en-US" smtClean="0"/>
+              <a:rPr lang="en-US"/>
               <a:t>Click to edit Master title style</a:t>
             </a:r>
-            <a:endParaRPr lang="en-US"/>
           </a:p>
         </p:txBody>
       </p:sp>
@@ -587,38 +600,37 @@
           <a:p>
             <a:pPr lvl="0"/>
             <a:r>
-              <a:rPr lang="en-US" smtClean="0"/>
+              <a:rPr lang="en-US"/>
               <a:t>Click to edit Master text styles</a:t>
             </a:r>
           </a:p>
           <a:p>
             <a:pPr lvl="1"/>
             <a:r>
-              <a:rPr lang="en-US" smtClean="0"/>
+              <a:rPr lang="en-US"/>
               <a:t>Second level</a:t>
             </a:r>
           </a:p>
           <a:p>
             <a:pPr lvl="2"/>
             <a:r>
-              <a:rPr lang="en-US" smtClean="0"/>
+              <a:rPr lang="en-US"/>
               <a:t>Third level</a:t>
             </a:r>
           </a:p>
           <a:p>
             <a:pPr lvl="3"/>
             <a:r>
-              <a:rPr lang="en-US" smtClean="0"/>
+              <a:rPr lang="en-US"/>
               <a:t>Fourth level</a:t>
             </a:r>
           </a:p>
           <a:p>
             <a:pPr lvl="4"/>
             <a:r>
-              <a:rPr lang="en-US" smtClean="0"/>
+              <a:rPr lang="en-US"/>
               <a:t>Fifth level</a:t>
             </a:r>
-            <a:endParaRPr lang="en-US"/>
           </a:p>
         </p:txBody>
       </p:sp>
@@ -639,7 +651,7 @@
           <a:p>
             <a:fld id="{5BCAD085-E8A6-8845-BD4E-CB4CCA059FC4}" type="datetimeFigureOut">
               <a:rPr lang="en-US" smtClean="0"/>
-              <a:t>1/27/13</a:t>
+              <a:t>6/2/2025</a:t>
             </a:fld>
             <a:endParaRPr lang="en-US"/>
           </a:p>
@@ -733,10 +745,9 @@
           <a:lstStyle/>
           <a:p>
             <a:r>
-              <a:rPr lang="en-US" smtClean="0"/>
+              <a:rPr lang="en-US"/>
               <a:t>Click to edit Master title style</a:t>
             </a:r>
-            <a:endParaRPr lang="en-US"/>
           </a:p>
         </p:txBody>
       </p:sp>
@@ -757,38 +768,37 @@
           <a:p>
             <a:pPr lvl="0"/>
             <a:r>
-              <a:rPr lang="en-US" smtClean="0"/>
+              <a:rPr lang="en-US"/>
               <a:t>Click to edit Master text styles</a:t>
             </a:r>
           </a:p>
           <a:p>
             <a:pPr lvl="1"/>
             <a:r>
-              <a:rPr lang="en-US" smtClean="0"/>
+              <a:rPr lang="en-US"/>
               <a:t>Second level</a:t>
             </a:r>
           </a:p>
           <a:p>
             <a:pPr lvl="2"/>
             <a:r>
-              <a:rPr lang="en-US" smtClean="0"/>
+              <a:rPr lang="en-US"/>
               <a:t>Third level</a:t>
             </a:r>
           </a:p>
           <a:p>
             <a:pPr lvl="3"/>
             <a:r>
-              <a:rPr lang="en-US" smtClean="0"/>
+              <a:rPr lang="en-US"/>
               <a:t>Fourth level</a:t>
             </a:r>
           </a:p>
           <a:p>
             <a:pPr lvl="4"/>
             <a:r>
-              <a:rPr lang="en-US" smtClean="0"/>
+              <a:rPr lang="en-US"/>
               <a:t>Fifth level</a:t>
             </a:r>
-            <a:endParaRPr lang="en-US"/>
           </a:p>
         </p:txBody>
       </p:sp>
@@ -809,7 +819,7 @@
           <a:p>
             <a:fld id="{5BCAD085-E8A6-8845-BD4E-CB4CCA059FC4}" type="datetimeFigureOut">
               <a:rPr lang="en-US" smtClean="0"/>
-              <a:t>1/27/13</a:t>
+              <a:t>6/2/2025</a:t>
             </a:fld>
             <a:endParaRPr lang="en-US"/>
           </a:p>
@@ -912,10 +922,9 @@
           </a:lstStyle>
           <a:p>
             <a:r>
-              <a:rPr lang="en-US" smtClean="0"/>
+              <a:rPr lang="en-US"/>
               <a:t>Click to edit Master title style</a:t>
             </a:r>
-            <a:endParaRPr lang="en-US"/>
           </a:p>
         </p:txBody>
       </p:sp>
@@ -1032,7 +1041,7 @@
           <a:p>
             <a:pPr lvl="0"/>
             <a:r>
-              <a:rPr lang="en-US" smtClean="0"/>
+              <a:rPr lang="en-US"/>
               <a:t>Click to edit Master text styles</a:t>
             </a:r>
           </a:p>
@@ -1055,7 +1064,7 @@
           <a:p>
             <a:fld id="{5BCAD085-E8A6-8845-BD4E-CB4CCA059FC4}" type="datetimeFigureOut">
               <a:rPr lang="en-US" smtClean="0"/>
-              <a:t>1/27/13</a:t>
+              <a:t>6/2/2025</a:t>
             </a:fld>
             <a:endParaRPr lang="en-US"/>
           </a:p>
@@ -1149,10 +1158,9 @@
           <a:lstStyle/>
           <a:p>
             <a:r>
-              <a:rPr lang="en-US" smtClean="0"/>
+              <a:rPr lang="en-US"/>
               <a:t>Click to edit Master title style</a:t>
             </a:r>
-            <a:endParaRPr lang="en-US"/>
           </a:p>
         </p:txBody>
       </p:sp>
@@ -1206,38 +1214,37 @@
           <a:p>
             <a:pPr lvl="0"/>
             <a:r>
-              <a:rPr lang="en-US" smtClean="0"/>
+              <a:rPr lang="en-US"/>
               <a:t>Click to edit Master text styles</a:t>
             </a:r>
           </a:p>
           <a:p>
             <a:pPr lvl="1"/>
             <a:r>
-              <a:rPr lang="en-US" smtClean="0"/>
+              <a:rPr lang="en-US"/>
               <a:t>Second level</a:t>
             </a:r>
           </a:p>
           <a:p>
             <a:pPr lvl="2"/>
             <a:r>
-              <a:rPr lang="en-US" smtClean="0"/>
+              <a:rPr lang="en-US"/>
               <a:t>Third level</a:t>
             </a:r>
           </a:p>
           <a:p>
             <a:pPr lvl="3"/>
             <a:r>
-              <a:rPr lang="en-US" smtClean="0"/>
+              <a:rPr lang="en-US"/>
               <a:t>Fourth level</a:t>
             </a:r>
           </a:p>
           <a:p>
             <a:pPr lvl="4"/>
             <a:r>
-              <a:rPr lang="en-US" smtClean="0"/>
+              <a:rPr lang="en-US"/>
               <a:t>Fifth level</a:t>
             </a:r>
-            <a:endParaRPr lang="en-US"/>
           </a:p>
         </p:txBody>
       </p:sp>
@@ -1291,38 +1298,37 @@
           <a:p>
             <a:pPr lvl="0"/>
             <a:r>
-              <a:rPr lang="en-US" smtClean="0"/>
+              <a:rPr lang="en-US"/>
               <a:t>Click to edit Master text styles</a:t>
             </a:r>
           </a:p>
           <a:p>
             <a:pPr lvl="1"/>
             <a:r>
-              <a:rPr lang="en-US" smtClean="0"/>
+              <a:rPr lang="en-US"/>
               <a:t>Second level</a:t>
             </a:r>
           </a:p>
           <a:p>
             <a:pPr lvl="2"/>
             <a:r>
-              <a:rPr lang="en-US" smtClean="0"/>
+              <a:rPr lang="en-US"/>
               <a:t>Third level</a:t>
             </a:r>
           </a:p>
           <a:p>
             <a:pPr lvl="3"/>
             <a:r>
-              <a:rPr lang="en-US" smtClean="0"/>
+              <a:rPr lang="en-US"/>
               <a:t>Fourth level</a:t>
             </a:r>
           </a:p>
           <a:p>
             <a:pPr lvl="4"/>
             <a:r>
-              <a:rPr lang="en-US" smtClean="0"/>
+              <a:rPr lang="en-US"/>
               <a:t>Fifth level</a:t>
             </a:r>
-            <a:endParaRPr lang="en-US"/>
           </a:p>
         </p:txBody>
       </p:sp>
@@ -1343,7 +1349,7 @@
           <a:p>
             <a:fld id="{5BCAD085-E8A6-8845-BD4E-CB4CCA059FC4}" type="datetimeFigureOut">
               <a:rPr lang="en-US" smtClean="0"/>
-              <a:t>1/27/13</a:t>
+              <a:t>6/2/2025</a:t>
             </a:fld>
             <a:endParaRPr lang="en-US"/>
           </a:p>
@@ -1441,10 +1447,9 @@
           </a:lstStyle>
           <a:p>
             <a:r>
-              <a:rPr lang="en-US" smtClean="0"/>
+              <a:rPr lang="en-US"/>
               <a:t>Click to edit Master title style</a:t>
             </a:r>
-            <a:endParaRPr lang="en-US"/>
           </a:p>
         </p:txBody>
       </p:sp>
@@ -1507,7 +1512,7 @@
           <a:p>
             <a:pPr lvl="0"/>
             <a:r>
-              <a:rPr lang="en-US" smtClean="0"/>
+              <a:rPr lang="en-US"/>
               <a:t>Click to edit Master text styles</a:t>
             </a:r>
           </a:p>
@@ -1563,38 +1568,37 @@
           <a:p>
             <a:pPr lvl="0"/>
             <a:r>
-              <a:rPr lang="en-US" smtClean="0"/>
+              <a:rPr lang="en-US"/>
               <a:t>Click to edit Master text styles</a:t>
             </a:r>
           </a:p>
           <a:p>
             <a:pPr lvl="1"/>
             <a:r>
-              <a:rPr lang="en-US" smtClean="0"/>
+              <a:rPr lang="en-US"/>
               <a:t>Second level</a:t>
             </a:r>
           </a:p>
           <a:p>
             <a:pPr lvl="2"/>
             <a:r>
-              <a:rPr lang="en-US" smtClean="0"/>
+              <a:rPr lang="en-US"/>
               <a:t>Third level</a:t>
             </a:r>
           </a:p>
           <a:p>
             <a:pPr lvl="3"/>
             <a:r>
-              <a:rPr lang="en-US" smtClean="0"/>
+              <a:rPr lang="en-US"/>
               <a:t>Fourth level</a:t>
             </a:r>
           </a:p>
           <a:p>
             <a:pPr lvl="4"/>
             <a:r>
-              <a:rPr lang="en-US" smtClean="0"/>
+              <a:rPr lang="en-US"/>
               <a:t>Fifth level</a:t>
             </a:r>
-            <a:endParaRPr lang="en-US"/>
           </a:p>
         </p:txBody>
       </p:sp>
@@ -1657,7 +1661,7 @@
           <a:p>
             <a:pPr lvl="0"/>
             <a:r>
-              <a:rPr lang="en-US" smtClean="0"/>
+              <a:rPr lang="en-US"/>
               <a:t>Click to edit Master text styles</a:t>
             </a:r>
           </a:p>
@@ -1713,38 +1717,37 @@
           <a:p>
             <a:pPr lvl="0"/>
             <a:r>
-              <a:rPr lang="en-US" smtClean="0"/>
+              <a:rPr lang="en-US"/>
               <a:t>Click to edit Master text styles</a:t>
             </a:r>
           </a:p>
           <a:p>
             <a:pPr lvl="1"/>
             <a:r>
-              <a:rPr lang="en-US" smtClean="0"/>
+              <a:rPr lang="en-US"/>
               <a:t>Second level</a:t>
             </a:r>
           </a:p>
           <a:p>
             <a:pPr lvl="2"/>
             <a:r>
-              <a:rPr lang="en-US" smtClean="0"/>
+              <a:rPr lang="en-US"/>
               <a:t>Third level</a:t>
             </a:r>
           </a:p>
           <a:p>
             <a:pPr lvl="3"/>
             <a:r>
-              <a:rPr lang="en-US" smtClean="0"/>
+              <a:rPr lang="en-US"/>
               <a:t>Fourth level</a:t>
             </a:r>
           </a:p>
           <a:p>
             <a:pPr lvl="4"/>
             <a:r>
-              <a:rPr lang="en-US" smtClean="0"/>
+              <a:rPr lang="en-US"/>
               <a:t>Fifth level</a:t>
             </a:r>
-            <a:endParaRPr lang="en-US"/>
           </a:p>
         </p:txBody>
       </p:sp>
@@ -1765,7 +1768,7 @@
           <a:p>
             <a:fld id="{5BCAD085-E8A6-8845-BD4E-CB4CCA059FC4}" type="datetimeFigureOut">
               <a:rPr lang="en-US" smtClean="0"/>
-              <a:t>1/27/13</a:t>
+              <a:t>6/2/2025</a:t>
             </a:fld>
             <a:endParaRPr lang="en-US"/>
           </a:p>
@@ -1859,10 +1862,9 @@
           <a:lstStyle/>
           <a:p>
             <a:r>
-              <a:rPr lang="en-US" smtClean="0"/>
+              <a:rPr lang="en-US"/>
               <a:t>Click to edit Master title style</a:t>
             </a:r>
-            <a:endParaRPr lang="en-US"/>
           </a:p>
         </p:txBody>
       </p:sp>
@@ -1883,7 +1885,7 @@
           <a:p>
             <a:fld id="{5BCAD085-E8A6-8845-BD4E-CB4CCA059FC4}" type="datetimeFigureOut">
               <a:rPr lang="en-US" smtClean="0"/>
-              <a:t>1/27/13</a:t>
+              <a:t>6/2/2025</a:t>
             </a:fld>
             <a:endParaRPr lang="en-US"/>
           </a:p>
@@ -1978,7 +1980,7 @@
           <a:p>
             <a:fld id="{5BCAD085-E8A6-8845-BD4E-CB4CCA059FC4}" type="datetimeFigureOut">
               <a:rPr lang="en-US" smtClean="0"/>
-              <a:t>1/27/13</a:t>
+              <a:t>6/2/2025</a:t>
             </a:fld>
             <a:endParaRPr lang="en-US"/>
           </a:p>
@@ -2081,10 +2083,9 @@
           </a:lstStyle>
           <a:p>
             <a:r>
-              <a:rPr lang="en-US" smtClean="0"/>
+              <a:rPr lang="en-US"/>
               <a:t>Click to edit Master title style</a:t>
             </a:r>
-            <a:endParaRPr lang="en-US"/>
           </a:p>
         </p:txBody>
       </p:sp>
@@ -2138,38 +2139,37 @@
           <a:p>
             <a:pPr lvl="0"/>
             <a:r>
-              <a:rPr lang="en-US" smtClean="0"/>
+              <a:rPr lang="en-US"/>
               <a:t>Click to edit Master text styles</a:t>
             </a:r>
           </a:p>
           <a:p>
             <a:pPr lvl="1"/>
             <a:r>
-              <a:rPr lang="en-US" smtClean="0"/>
+              <a:rPr lang="en-US"/>
               <a:t>Second level</a:t>
             </a:r>
           </a:p>
           <a:p>
             <a:pPr lvl="2"/>
             <a:r>
-              <a:rPr lang="en-US" smtClean="0"/>
+              <a:rPr lang="en-US"/>
               <a:t>Third level</a:t>
             </a:r>
           </a:p>
           <a:p>
             <a:pPr lvl="3"/>
             <a:r>
-              <a:rPr lang="en-US" smtClean="0"/>
+              <a:rPr lang="en-US"/>
               <a:t>Fourth level</a:t>
             </a:r>
           </a:p>
           <a:p>
             <a:pPr lvl="4"/>
             <a:r>
-              <a:rPr lang="en-US" smtClean="0"/>
+              <a:rPr lang="en-US"/>
               <a:t>Fifth level</a:t>
             </a:r>
-            <a:endParaRPr lang="en-US"/>
           </a:p>
         </p:txBody>
       </p:sp>
@@ -2232,7 +2232,7 @@
           <a:p>
             <a:pPr lvl="0"/>
             <a:r>
-              <a:rPr lang="en-US" smtClean="0"/>
+              <a:rPr lang="en-US"/>
               <a:t>Click to edit Master text styles</a:t>
             </a:r>
           </a:p>
@@ -2255,7 +2255,7 @@
           <a:p>
             <a:fld id="{5BCAD085-E8A6-8845-BD4E-CB4CCA059FC4}" type="datetimeFigureOut">
               <a:rPr lang="en-US" smtClean="0"/>
-              <a:t>1/27/13</a:t>
+              <a:t>6/2/2025</a:t>
             </a:fld>
             <a:endParaRPr lang="en-US"/>
           </a:p>
@@ -2358,10 +2358,9 @@
           </a:lstStyle>
           <a:p>
             <a:r>
-              <a:rPr lang="en-US" smtClean="0"/>
+              <a:rPr lang="en-US"/>
               <a:t>Click to edit Master title style</a:t>
             </a:r>
-            <a:endParaRPr lang="en-US"/>
           </a:p>
         </p:txBody>
       </p:sp>
@@ -2485,7 +2484,7 @@
           <a:p>
             <a:pPr lvl="0"/>
             <a:r>
-              <a:rPr lang="en-US" smtClean="0"/>
+              <a:rPr lang="en-US"/>
               <a:t>Click to edit Master text styles</a:t>
             </a:r>
           </a:p>
@@ -2508,7 +2507,7 @@
           <a:p>
             <a:fld id="{5BCAD085-E8A6-8845-BD4E-CB4CCA059FC4}" type="datetimeFigureOut">
               <a:rPr lang="en-US" smtClean="0"/>
-              <a:t>1/27/13</a:t>
+              <a:t>6/2/2025</a:t>
             </a:fld>
             <a:endParaRPr lang="en-US"/>
           </a:p>
@@ -2617,10 +2616,9 @@
           <a:lstStyle/>
           <a:p>
             <a:r>
-              <a:rPr lang="en-US" smtClean="0"/>
+              <a:rPr lang="en-US"/>
               <a:t>Click to edit Master title style</a:t>
             </a:r>
-            <a:endParaRPr lang="en-US"/>
           </a:p>
         </p:txBody>
       </p:sp>
@@ -2651,38 +2649,37 @@
           <a:p>
             <a:pPr lvl="0"/>
             <a:r>
-              <a:rPr lang="en-US" smtClean="0"/>
+              <a:rPr lang="en-US"/>
               <a:t>Click to edit Master text styles</a:t>
             </a:r>
           </a:p>
           <a:p>
             <a:pPr lvl="1"/>
             <a:r>
-              <a:rPr lang="en-US" smtClean="0"/>
+              <a:rPr lang="en-US"/>
               <a:t>Second level</a:t>
             </a:r>
           </a:p>
           <a:p>
             <a:pPr lvl="2"/>
             <a:r>
-              <a:rPr lang="en-US" smtClean="0"/>
+              <a:rPr lang="en-US"/>
               <a:t>Third level</a:t>
             </a:r>
           </a:p>
           <a:p>
             <a:pPr lvl="3"/>
             <a:r>
-              <a:rPr lang="en-US" smtClean="0"/>
+              <a:rPr lang="en-US"/>
               <a:t>Fourth level</a:t>
             </a:r>
           </a:p>
           <a:p>
             <a:pPr lvl="4"/>
             <a:r>
-              <a:rPr lang="en-US" smtClean="0"/>
+              <a:rPr lang="en-US"/>
               <a:t>Fifth level</a:t>
             </a:r>
-            <a:endParaRPr lang="en-US"/>
           </a:p>
         </p:txBody>
       </p:sp>
@@ -2721,7 +2718,7 @@
           <a:p>
             <a:fld id="{5BCAD085-E8A6-8845-BD4E-CB4CCA059FC4}" type="datetimeFigureOut">
               <a:rPr lang="en-US" smtClean="0"/>
-              <a:t>1/27/13</a:t>
+              <a:t>6/2/2025</a:t>
             </a:fld>
             <a:endParaRPr lang="en-US"/>
           </a:p>
@@ -3080,7 +3077,7 @@
 </file>
 
 <file path=ppt/slides/slide1.xml><?xml version="1.0" encoding="utf-8"?>
-<p:sld xmlns:a="http://schemas.openxmlformats.org/drawingml/2006/main" xmlns:p="http://schemas.openxmlformats.org/presentationml/2006/main" xmlns:r="http://schemas.openxmlformats.org/officeDocument/2006/relationships">
+<p:sld xmlns:a="http://schemas.openxmlformats.org/drawingml/2006/main" xmlns:r="http://schemas.openxmlformats.org/officeDocument/2006/relationships" xmlns:p="http://schemas.openxmlformats.org/presentationml/2006/main">
   <p:cSld>
     <p:bg>
       <p:bgPr>
@@ -3096,10 +3093,17 @@
         <p:cNvGrpSpPr/>
         <p:nvPr/>
       </p:nvGrpSpPr>
-      <p:grpSpPr/>
+      <p:grpSpPr>
+        <a:xfrm>
+          <a:off x="0" y="0"/>
+          <a:ext cx="0" cy="0"/>
+          <a:chOff x="0" y="0"/>
+          <a:chExt cx="0" cy="0"/>
+        </a:xfrm>
+      </p:grpSpPr>
       <p:pic>
         <p:nvPicPr>
-          <p:cNvPr id="2" name="Picture 1" descr="file-7jirRgR7C4qEBBeLteuHrX"/>
+          <p:cNvPr id="2" name="Picture 1" descr="file-56tTjf9CPyjH7Ck8sKSt9E"/>
           <p:cNvPicPr>
             <a:picLocks noChangeAspect="1"/>
           </p:cNvPicPr>
@@ -3113,14 +3117,61 @@
         </p:blipFill>
         <p:spPr>
           <a:xfrm>
-            <a:off x="182880" y="1645920"/>
-            <a:ext cx="8778240" cy="4480560"/>
+            <a:off x="0" y="0"/>
+            <a:ext cx="9144000" cy="6858000"/>
           </a:xfrm>
           <a:prstGeom prst="rect">
             <a:avLst/>
           </a:prstGeom>
         </p:spPr>
       </p:pic>
+      <p:sp>
+        <p:nvSpPr>
+          <p:cNvPr id="3" name="TextBox 2"/>
+          <p:cNvSpPr txBox="1"/>
+          <p:nvPr/>
+        </p:nvSpPr>
+        <p:spPr>
+          <a:xfrm>
+            <a:off x="914400" y="1828800"/>
+            <a:ext cx="7315200" cy="914400"/>
+          </a:xfrm>
+          <a:prstGeom prst="rect">
+            <a:avLst/>
+          </a:prstGeom>
+          <a:noFill/>
+        </p:spPr>
+        <p:txBody>
+          <a:bodyPr wrap="none">
+            <a:spAutoFit/>
+          </a:bodyPr>
+          <a:lstStyle/>
+          <a:p>
+            <a:pPr>
+              <a:defRPr sz="4400">
+                <a:solidFill>
+                  <a:srgbClr val="FFFFFF"/>
+                </a:solidFill>
+              </a:defRPr>
+            </a:pPr>
+            <a:r>
+              <a:t>Birdsong Paradise</a:t>
+            </a:r>
+          </a:p>
+          <a:p>
+            <a:pPr>
+              <a:defRPr sz="4400">
+                <a:solidFill>
+                  <a:srgbClr val="FFFFFF"/>
+                </a:solidFill>
+              </a:defRPr>
+            </a:pPr>
+            <a:r>
+              <a:t>Pop Music Analysis</a:t>
+            </a:r>
+          </a:p>
+        </p:txBody>
+      </p:sp>
     </p:spTree>
   </p:cSld>
   <p:clrMapOvr>
@@ -3130,7 +3181,7 @@
 </file>
 
 <file path=ppt/slides/slide2.xml><?xml version="1.0" encoding="utf-8"?>
-<p:sld xmlns:a="http://schemas.openxmlformats.org/drawingml/2006/main" xmlns:p="http://schemas.openxmlformats.org/presentationml/2006/main" xmlns:r="http://schemas.openxmlformats.org/officeDocument/2006/relationships">
+<p:sld xmlns:a="http://schemas.openxmlformats.org/drawingml/2006/main" xmlns:r="http://schemas.openxmlformats.org/officeDocument/2006/relationships" xmlns:p="http://schemas.openxmlformats.org/presentationml/2006/main">
   <p:cSld>
     <p:bg>
       <p:bgPr>
@@ -3146,10 +3197,17 @@
         <p:cNvGrpSpPr/>
         <p:nvPr/>
       </p:nvGrpSpPr>
-      <p:grpSpPr/>
+      <p:grpSpPr>
+        <a:xfrm>
+          <a:off x="0" y="0"/>
+          <a:ext cx="0" cy="0"/>
+          <a:chOff x="0" y="0"/>
+          <a:chExt cx="0" cy="0"/>
+        </a:xfrm>
+      </p:grpSpPr>
       <p:pic>
         <p:nvPicPr>
-          <p:cNvPr id="2" name="Picture 1" descr="file-9wkyp7acqxukqzEgm2P3C9"/>
+          <p:cNvPr id="2" name="Picture 1" descr="file-VjJ64ZssD4YiQngMojBP1L"/>
           <p:cNvPicPr>
             <a:picLocks noChangeAspect="1"/>
           </p:cNvPicPr>
@@ -3192,17 +3250,19 @@
             <a:spAutoFit/>
           </a:bodyPr>
           <a:lstStyle/>
-          <a:p/>
+          <a:p>
+            <a:endParaRPr/>
+          </a:p>
           <a:p>
             <a:pPr algn="ctr">
-              <a:defRPr b="1" sz="2800">
+              <a:defRPr sz="2800" b="1">
                 <a:solidFill>
                   <a:srgbClr val="FFFFFF"/>
                 </a:solidFill>
               </a:defRPr>
             </a:pPr>
             <a:r>
-              <a:t>Evolving Popularity: Peaks &amp; Trends in Top Artists' Music (2015-2019)</a:t>
+              <a:t>Evolving Tastes: The Rise of Song Popularity Over Years</a:t>
             </a:r>
           </a:p>
         </p:txBody>
@@ -3215,8 +3275,8 @@
         </p:nvSpPr>
         <p:spPr>
           <a:xfrm>
-            <a:off x="6096000" y="1645920"/>
-            <a:ext cx="3048000" cy="5029200"/>
+            <a:off x="6096000" y="1371600"/>
+            <a:ext cx="3048000" cy="4114800"/>
           </a:xfrm>
           <a:prstGeom prst="rect">
             <a:avLst/>
@@ -3224,16 +3284,18 @@
           <a:noFill/>
         </p:spPr>
         <p:txBody>
-          <a:bodyPr wrap="none">
+          <a:bodyPr wrap="none" tIns="91440">
             <a:spAutoFit/>
           </a:bodyPr>
           <a:lstStyle/>
-          <a:p/>
+          <a:p>
+            <a:endParaRPr/>
+          </a:p>
           <a:p>
             <a:pPr algn="l">
-              <a:defRPr b="1" sz="2400">
+              <a:defRPr sz="2400" b="1">
                 <a:solidFill>
-                  <a:srgbClr val="FFD700"/>
+                  <a:srgbClr val="008064"/>
                 </a:solidFill>
               </a:defRPr>
             </a:pPr>
@@ -3253,11 +3315,315 @@
               </a:defRPr>
             </a:pPr>
             <a:r>
-              <a:t>• The chart highlights significant fluctuations in track popularity by year.</a:t>
+              <a:t>• Upward trend in song popularity since 2018.</a:t>
             </a:r>
             <a:br/>
             <a:r>
-              <a:t>• Increasing track popularity post-2015 suggests evolving listener preferences.</a:t>
+              <a:t>• Digital platforms may influence music consumption behaviors.</a:t>
+            </a:r>
+          </a:p>
+        </p:txBody>
+      </p:sp>
+    </p:spTree>
+  </p:cSld>
+  <p:clrMapOvr>
+    <a:masterClrMapping/>
+  </p:clrMapOvr>
+</p:sld>
+</file>
+
+<file path=ppt/slides/slide3.xml><?xml version="1.0" encoding="utf-8"?>
+<p:sld xmlns:a="http://schemas.openxmlformats.org/drawingml/2006/main" xmlns:r="http://schemas.openxmlformats.org/officeDocument/2006/relationships" xmlns:p="http://schemas.openxmlformats.org/presentationml/2006/main">
+  <p:cSld>
+    <p:bg>
+      <p:bgPr>
+        <a:solidFill>
+          <a:srgbClr val="000000"/>
+        </a:solidFill>
+        <a:effectLst/>
+      </p:bgPr>
+    </p:bg>
+    <p:spTree>
+      <p:nvGrpSpPr>
+        <p:cNvPr id="1" name=""/>
+        <p:cNvGrpSpPr/>
+        <p:nvPr/>
+      </p:nvGrpSpPr>
+      <p:grpSpPr>
+        <a:xfrm>
+          <a:off x="0" y="0"/>
+          <a:ext cx="0" cy="0"/>
+          <a:chOff x="0" y="0"/>
+          <a:chExt cx="0" cy="0"/>
+        </a:xfrm>
+      </p:grpSpPr>
+      <p:pic>
+        <p:nvPicPr>
+          <p:cNvPr id="2" name="Picture 1" descr="file-897iMKBszLKgtoeEUKFf7z"/>
+          <p:cNvPicPr>
+            <a:picLocks noChangeAspect="1"/>
+          </p:cNvPicPr>
+          <p:nvPr/>
+        </p:nvPicPr>
+        <p:blipFill>
+          <a:blip r:embed="rId2"/>
+          <a:stretch>
+            <a:fillRect/>
+          </a:stretch>
+        </p:blipFill>
+        <p:spPr>
+          <a:xfrm>
+            <a:off x="182880" y="1645920"/>
+            <a:ext cx="5486400" cy="4114800"/>
+          </a:xfrm>
+          <a:prstGeom prst="rect">
+            <a:avLst/>
+          </a:prstGeom>
+        </p:spPr>
+      </p:pic>
+      <p:sp>
+        <p:nvSpPr>
+          <p:cNvPr id="3" name="TextBox 2"/>
+          <p:cNvSpPr txBox="1"/>
+          <p:nvPr/>
+        </p:nvSpPr>
+        <p:spPr>
+          <a:xfrm>
+            <a:off x="0" y="0"/>
+            <a:ext cx="9144000" cy="914400"/>
+          </a:xfrm>
+          <a:prstGeom prst="rect">
+            <a:avLst/>
+          </a:prstGeom>
+          <a:noFill/>
+        </p:spPr>
+        <p:txBody>
+          <a:bodyPr wrap="none">
+            <a:spAutoFit/>
+          </a:bodyPr>
+          <a:lstStyle/>
+          <a:p>
+            <a:endParaRPr/>
+          </a:p>
+          <a:p>
+            <a:pPr algn="ctr">
+              <a:defRPr sz="2800" b="1">
+                <a:solidFill>
+                  <a:srgbClr val="FFFFFF"/>
+                </a:solidFill>
+              </a:defRPr>
+            </a:pPr>
+            <a:r>
+              <a:t>Genre Dynamics: Pop and Dance Pave the Chart's Top</a:t>
+            </a:r>
+          </a:p>
+        </p:txBody>
+      </p:sp>
+      <p:sp>
+        <p:nvSpPr>
+          <p:cNvPr id="4" name="TextBox 3"/>
+          <p:cNvSpPr txBox="1"/>
+          <p:nvPr/>
+        </p:nvSpPr>
+        <p:spPr>
+          <a:xfrm>
+            <a:off x="6096000" y="1371600"/>
+            <a:ext cx="3048000" cy="4114800"/>
+          </a:xfrm>
+          <a:prstGeom prst="rect">
+            <a:avLst/>
+          </a:prstGeom>
+          <a:noFill/>
+        </p:spPr>
+        <p:txBody>
+          <a:bodyPr wrap="none" tIns="91440">
+            <a:spAutoFit/>
+          </a:bodyPr>
+          <a:lstStyle/>
+          <a:p>
+            <a:endParaRPr/>
+          </a:p>
+          <a:p>
+            <a:pPr algn="l">
+              <a:defRPr sz="2400" b="1">
+                <a:solidFill>
+                  <a:srgbClr val="008064"/>
+                </a:solidFill>
+              </a:defRPr>
+            </a:pPr>
+            <a:r>
+              <a:t>Key Insights:</a:t>
+            </a:r>
+          </a:p>
+          <a:p>
+            <a:pPr>
+              <a:lnSpc>
+                <a:spcPct val="150000"/>
+              </a:lnSpc>
+              <a:defRPr sz="1200">
+                <a:solidFill>
+                  <a:srgbClr val="FFFFFF"/>
+                </a:solidFill>
+              </a:defRPr>
+            </a:pPr>
+            <a:r>
+              <a:t>• Pop and dance genres lead in popularity, reflecting their widespread appeal.</a:t>
+            </a:r>
+            <a:br/>
+            <a:r>
+              <a:t>• Hip-hop's smaller representation suggests niche preferences.</a:t>
+            </a:r>
+          </a:p>
+        </p:txBody>
+      </p:sp>
+    </p:spTree>
+  </p:cSld>
+  <p:clrMapOvr>
+    <a:masterClrMapping/>
+  </p:clrMapOvr>
+</p:sld>
+</file>
+
+<file path=ppt/slides/slide4.xml><?xml version="1.0" encoding="utf-8"?>
+<p:sld xmlns:a="http://schemas.openxmlformats.org/drawingml/2006/main" xmlns:r="http://schemas.openxmlformats.org/officeDocument/2006/relationships" xmlns:p="http://schemas.openxmlformats.org/presentationml/2006/main">
+  <p:cSld>
+    <p:bg>
+      <p:bgPr>
+        <a:solidFill>
+          <a:srgbClr val="000000"/>
+        </a:solidFill>
+        <a:effectLst/>
+      </p:bgPr>
+    </p:bg>
+    <p:spTree>
+      <p:nvGrpSpPr>
+        <p:cNvPr id="1" name=""/>
+        <p:cNvGrpSpPr/>
+        <p:nvPr/>
+      </p:nvGrpSpPr>
+      <p:grpSpPr>
+        <a:xfrm>
+          <a:off x="0" y="0"/>
+          <a:ext cx="0" cy="0"/>
+          <a:chOff x="0" y="0"/>
+          <a:chExt cx="0" cy="0"/>
+        </a:xfrm>
+      </p:grpSpPr>
+      <p:pic>
+        <p:nvPicPr>
+          <p:cNvPr id="2" name="Picture 1" descr="file-VRas6S1LPLyHVj222g8Mif"/>
+          <p:cNvPicPr>
+            <a:picLocks noChangeAspect="1"/>
+          </p:cNvPicPr>
+          <p:nvPr/>
+        </p:nvPicPr>
+        <p:blipFill>
+          <a:blip r:embed="rId2"/>
+          <a:stretch>
+            <a:fillRect/>
+          </a:stretch>
+        </p:blipFill>
+        <p:spPr>
+          <a:xfrm>
+            <a:off x="182880" y="1645920"/>
+            <a:ext cx="5486400" cy="4114800"/>
+          </a:xfrm>
+          <a:prstGeom prst="rect">
+            <a:avLst/>
+          </a:prstGeom>
+        </p:spPr>
+      </p:pic>
+      <p:sp>
+        <p:nvSpPr>
+          <p:cNvPr id="3" name="TextBox 2"/>
+          <p:cNvSpPr txBox="1"/>
+          <p:nvPr/>
+        </p:nvSpPr>
+        <p:spPr>
+          <a:xfrm>
+            <a:off x="0" y="0"/>
+            <a:ext cx="9144000" cy="914400"/>
+          </a:xfrm>
+          <a:prstGeom prst="rect">
+            <a:avLst/>
+          </a:prstGeom>
+          <a:noFill/>
+        </p:spPr>
+        <p:txBody>
+          <a:bodyPr wrap="none">
+            <a:spAutoFit/>
+          </a:bodyPr>
+          <a:lstStyle/>
+          <a:p>
+            <a:endParaRPr/>
+          </a:p>
+          <a:p>
+            <a:pPr algn="ctr">
+              <a:defRPr sz="2800" b="1">
+                <a:solidFill>
+                  <a:srgbClr val="FFFFFF"/>
+                </a:solidFill>
+              </a:defRPr>
+            </a:pPr>
+            <a:r>
+              <a:t>Influence &amp; Popularity: Insights from the Top 10 Artists</a:t>
+            </a:r>
+          </a:p>
+        </p:txBody>
+      </p:sp>
+      <p:sp>
+        <p:nvSpPr>
+          <p:cNvPr id="4" name="TextBox 3"/>
+          <p:cNvSpPr txBox="1"/>
+          <p:nvPr/>
+        </p:nvSpPr>
+        <p:spPr>
+          <a:xfrm>
+            <a:off x="6096000" y="1371600"/>
+            <a:ext cx="3048000" cy="4114800"/>
+          </a:xfrm>
+          <a:prstGeom prst="rect">
+            <a:avLst/>
+          </a:prstGeom>
+          <a:noFill/>
+        </p:spPr>
+        <p:txBody>
+          <a:bodyPr wrap="none" tIns="91440">
+            <a:spAutoFit/>
+          </a:bodyPr>
+          <a:lstStyle/>
+          <a:p>
+            <a:endParaRPr/>
+          </a:p>
+          <a:p>
+            <a:pPr algn="l">
+              <a:defRPr sz="2400" b="1">
+                <a:solidFill>
+                  <a:srgbClr val="008064"/>
+                </a:solidFill>
+              </a:defRPr>
+            </a:pPr>
+            <a:r>
+              <a:t>Key Insights:</a:t>
+            </a:r>
+          </a:p>
+          <a:p>
+            <a:pPr>
+              <a:lnSpc>
+                <a:spcPct val="150000"/>
+              </a:lnSpc>
+              <a:defRPr sz="1200">
+                <a:solidFill>
+                  <a:srgbClr val="FFFFFF"/>
+                </a:solidFill>
+              </a:defRPr>
+            </a:pPr>
+            <a:r>
+              <a:t>• Top artists exhibit varied popularity trends, showing diverse audience reach.</a:t>
+            </a:r>
+            <a:br/>
+            <a:r>
+              <a:t>• Consistent high performers hint at strong production and marketing.</a:t>
             </a:r>
           </a:p>
         </p:txBody>

</xml_diff>